<commit_message>
updated F21 gdrive link
</commit_message>
<xml_diff>
--- a/assets/lectures/BPW_Lecture_07.pptx
+++ b/assets/lectures/BPW_Lecture_07.pptx
@@ -295,7 +295,7 @@
           <a:p>
             <a:fld id="{F57857CC-207A-4D73-9A20-C856A5068D10}" type="datetimeFigureOut">
               <a:rPr lang="en-US" smtClean="0"/>
-              <a:t>1/8/19</a:t>
+              <a:t>3/18/21</a:t>
             </a:fld>
             <a:endParaRPr lang="en-US"/>
           </a:p>
@@ -493,7 +493,7 @@
           <a:p>
             <a:fld id="{F57857CC-207A-4D73-9A20-C856A5068D10}" type="datetimeFigureOut">
               <a:rPr lang="en-US" smtClean="0"/>
-              <a:t>1/8/19</a:t>
+              <a:t>3/18/21</a:t>
             </a:fld>
             <a:endParaRPr lang="en-US"/>
           </a:p>
@@ -701,7 +701,7 @@
           <a:p>
             <a:fld id="{F57857CC-207A-4D73-9A20-C856A5068D10}" type="datetimeFigureOut">
               <a:rPr lang="en-US" smtClean="0"/>
-              <a:t>1/8/19</a:t>
+              <a:t>3/18/21</a:t>
             </a:fld>
             <a:endParaRPr lang="en-US"/>
           </a:p>
@@ -899,7 +899,7 @@
           <a:p>
             <a:fld id="{F57857CC-207A-4D73-9A20-C856A5068D10}" type="datetimeFigureOut">
               <a:rPr lang="en-US" smtClean="0"/>
-              <a:t>1/8/19</a:t>
+              <a:t>3/18/21</a:t>
             </a:fld>
             <a:endParaRPr lang="en-US"/>
           </a:p>
@@ -1174,7 +1174,7 @@
           <a:p>
             <a:fld id="{F57857CC-207A-4D73-9A20-C856A5068D10}" type="datetimeFigureOut">
               <a:rPr lang="en-US" smtClean="0"/>
-              <a:t>1/8/19</a:t>
+              <a:t>3/18/21</a:t>
             </a:fld>
             <a:endParaRPr lang="en-US"/>
           </a:p>
@@ -1439,7 +1439,7 @@
           <a:p>
             <a:fld id="{F57857CC-207A-4D73-9A20-C856A5068D10}" type="datetimeFigureOut">
               <a:rPr lang="en-US" smtClean="0"/>
-              <a:t>1/8/19</a:t>
+              <a:t>3/18/21</a:t>
             </a:fld>
             <a:endParaRPr lang="en-US"/>
           </a:p>
@@ -1851,7 +1851,7 @@
           <a:p>
             <a:fld id="{F57857CC-207A-4D73-9A20-C856A5068D10}" type="datetimeFigureOut">
               <a:rPr lang="en-US" smtClean="0"/>
-              <a:t>1/8/19</a:t>
+              <a:t>3/18/21</a:t>
             </a:fld>
             <a:endParaRPr lang="en-US"/>
           </a:p>
@@ -1992,7 +1992,7 @@
           <a:p>
             <a:fld id="{F57857CC-207A-4D73-9A20-C856A5068D10}" type="datetimeFigureOut">
               <a:rPr lang="en-US" smtClean="0"/>
-              <a:t>1/8/19</a:t>
+              <a:t>3/18/21</a:t>
             </a:fld>
             <a:endParaRPr lang="en-US"/>
           </a:p>
@@ -2105,7 +2105,7 @@
           <a:p>
             <a:fld id="{F57857CC-207A-4D73-9A20-C856A5068D10}" type="datetimeFigureOut">
               <a:rPr lang="en-US" smtClean="0"/>
-              <a:t>1/8/19</a:t>
+              <a:t>3/18/21</a:t>
             </a:fld>
             <a:endParaRPr lang="en-US"/>
           </a:p>
@@ -2416,7 +2416,7 @@
           <a:p>
             <a:fld id="{F57857CC-207A-4D73-9A20-C856A5068D10}" type="datetimeFigureOut">
               <a:rPr lang="en-US" smtClean="0"/>
-              <a:t>1/8/19</a:t>
+              <a:t>3/18/21</a:t>
             </a:fld>
             <a:endParaRPr lang="en-US"/>
           </a:p>
@@ -2704,7 +2704,7 @@
           <a:p>
             <a:fld id="{F57857CC-207A-4D73-9A20-C856A5068D10}" type="datetimeFigureOut">
               <a:rPr lang="en-US" smtClean="0"/>
-              <a:t>1/8/19</a:t>
+              <a:t>3/18/21</a:t>
             </a:fld>
             <a:endParaRPr lang="en-US"/>
           </a:p>
@@ -2945,7 +2945,7 @@
           <a:p>
             <a:fld id="{F57857CC-207A-4D73-9A20-C856A5068D10}" type="datetimeFigureOut">
               <a:rPr lang="en-US" smtClean="0"/>
-              <a:t>1/8/19</a:t>
+              <a:t>3/18/21</a:t>
             </a:fld>
             <a:endParaRPr lang="en-US"/>
           </a:p>
@@ -11186,7 +11186,27 @@
                   </a:schemeClr>
                 </a:solidFill>
               </a:rPr>
-              <a:t>  /* animation plays forwards then forwards */</a:t>
+              <a:t>  /* animation plays forwards </a:t>
+            </a:r>
+            <a:r>
+              <a:rPr lang="en-US">
+                <a:solidFill>
+                  <a:schemeClr val="bg1">
+                    <a:lumMod val="65000"/>
+                  </a:schemeClr>
+                </a:solidFill>
+              </a:rPr>
+              <a:t>then backwards </a:t>
+            </a:r>
+            <a:r>
+              <a:rPr lang="en-US" dirty="0">
+                <a:solidFill>
+                  <a:schemeClr val="bg1">
+                    <a:lumMod val="65000"/>
+                  </a:schemeClr>
+                </a:solidFill>
+              </a:rPr>
+              <a:t>*/</a:t>
             </a:r>
           </a:p>
           <a:p>

</xml_diff>